<commit_message>
making guide presentation, document updated
</commit_message>
<xml_diff>
--- a/TERM1-BLOCK1/2-ICTNWK541-Configure_Verify_Troubleshoot_WAN_links-IP_services/Assessmet_Task2/Task2/PacketTracer/guide-presentation.pptx
+++ b/TERM1-BLOCK1/2-ICTNWK541-Configure_Verify_Troubleshoot_WAN_links-IP_services/Assessmet_Task2/Task2/PacketTracer/guide-presentation.pptx
@@ -81,6 +81,7 @@
     <p:sldId id="329" r:id="rId76"/>
     <p:sldId id="330" r:id="rId77"/>
     <p:sldId id="331" r:id="rId78"/>
+    <p:sldId id="332" r:id="rId79"/>
   </p:sldIdLst>
   <p:sldSz cx="10080625" cy="5670550"/>
   <p:notesSz cx="7559675" cy="10691813"/>
@@ -225,7 +226,7 @@
         <p:txBody>
           <a:bodyPr/>
           <a:p>
-            <a:fld id="{0A9B735D-EAD8-498B-9665-9219527CF69D}" type="slidenum">
+            <a:fld id="{28BAEA5D-9F7D-4075-AFD1-0A8C1CBAE16D}" type="slidenum">
               <a:t>&lt;#&gt;</a:t>
             </a:fld>
           </a:p>
@@ -392,7 +393,7 @@
         <p:txBody>
           <a:bodyPr/>
           <a:p>
-            <a:fld id="{EA3B1446-34DE-4ACD-91DE-1CB0D64195AC}" type="slidenum">
+            <a:fld id="{27C2FF7F-06E2-447D-8A54-8ECC2C942F19}" type="slidenum">
               <a:t>&lt;#&gt;</a:t>
             </a:fld>
           </a:p>
@@ -923,7 +924,7 @@
             <a:pPr indent="0" algn="r">
               <a:buNone/>
             </a:pPr>
-            <a:fld id="{294623FC-78CE-41FA-A3F2-B08DD1A278C4}" type="slidenum">
+            <a:fld id="{B7DD3F04-990D-42C7-9728-4FAC6CC77BCD}" type="slidenum">
               <a:rPr b="0" lang="en-AU" sz="1400" strike="noStrike" u="none">
                 <a:solidFill>
                   <a:srgbClr val="000000"/>
@@ -2139,28 +2140,12 @@
             <a:normAutofit/>
           </a:bodyPr>
           <a:p>
-            <a:pPr marL="432000" indent="-324000">
+            <a:pPr indent="0">
               <a:spcBef>
                 <a:spcPts val="1417"/>
               </a:spcBef>
-              <a:buClr>
-                <a:srgbClr val="000000"/>
-              </a:buClr>
-              <a:buSzPct val="45000"/>
-              <a:buFont typeface="Wingdings" charset="2"/>
-              <a:buChar char=""/>
-            </a:pPr>
-            <a:r>
-              <a:rPr b="0" lang="en-AU" sz="3200" strike="noStrike" u="none">
-                <a:solidFill>
-                  <a:srgbClr val="000000"/>
-                </a:solidFill>
-                <a:effectLst/>
-                <a:uFillTx/>
-                <a:latin typeface="Arial"/>
-              </a:rPr>
-              <a:t>Installation plan</a:t>
-            </a:r>
+              <a:buNone/>
+            </a:pPr>
             <a:endParaRPr b="0" lang="en-AU" sz="3200" strike="noStrike" u="none">
               <a:solidFill>
                 <a:srgbClr val="000000"/>
@@ -2269,16 +2254,73 @@
         </p:spPr>
         <p:txBody>
           <a:bodyPr lIns="0" rIns="0" tIns="0" bIns="0" anchor="t">
-            <a:normAutofit/>
-          </a:bodyPr>
-          <a:p>
-            <a:pPr indent="0">
+            <a:normAutofit lnSpcReduction="9999"/>
+          </a:bodyPr>
+          <a:p>
+            <a:pPr marL="432000" indent="0">
               <a:spcBef>
                 <a:spcPts val="1417"/>
               </a:spcBef>
               <a:buNone/>
             </a:pPr>
+            <a:r>
+              <a:rPr b="0" lang="en-AU" sz="3200" strike="noStrike" u="none">
+                <a:solidFill>
+                  <a:srgbClr val="000000"/>
+                </a:solidFill>
+                <a:effectLst/>
+                <a:uFillTx/>
+                <a:latin typeface="Arial"/>
+              </a:rPr>
+              <a:t>It implements a dual-stack with a DHCP-router to avoid having dedicated servers. Redundancy is provided by LACP on the switches and HSRP (only Sydney) on the routers. Additionally, LACP provides three communication lanes to increase bandwidth. Communication between LAN networks over internet is provided by OSPF.</a:t>
+            </a:r>
             <a:endParaRPr b="0" lang="en-AU" sz="3200" strike="noStrike" u="none">
+              <a:solidFill>
+                <a:srgbClr val="000000"/>
+              </a:solidFill>
+              <a:effectLst/>
+              <a:uFillTx/>
+              <a:latin typeface="Arial"/>
+            </a:endParaRPr>
+          </a:p>
+        </p:txBody>
+      </p:sp>
+      <p:sp>
+        <p:nvSpPr>
+          <p:cNvPr id="45" name=""/>
+          <p:cNvSpPr txBox="1"/>
+          <p:nvPr/>
+        </p:nvSpPr>
+        <p:spPr>
+          <a:xfrm>
+            <a:off x="4585320" y="2712240"/>
+            <a:ext cx="911520" cy="232560"/>
+          </a:xfrm>
+          <a:prstGeom prst="rect">
+            <a:avLst/>
+          </a:prstGeom>
+          <a:noFill/>
+          <a:ln w="0">
+            <a:noFill/>
+          </a:ln>
+        </p:spPr>
+        <p:txBody>
+          <a:bodyPr lIns="90000" rIns="90000" tIns="45000" bIns="45000" anchor="t">
+            <a:spAutoFit/>
+          </a:bodyPr>
+          <a:p>
+            <a:r>
+              <a:rPr b="0" lang="en-AU" sz="1000" strike="noStrike" u="none">
+                <a:solidFill>
+                  <a:srgbClr val="000000"/>
+                </a:solidFill>
+                <a:effectLst/>
+                <a:uFillTx/>
+                <a:latin typeface="Arial"/>
+              </a:rPr>
+              <a:t>DHCP-router</a:t>
+            </a:r>
+            <a:endParaRPr b="0" lang="en-AU" sz="1000" strike="noStrike" u="none">
               <a:solidFill>
                 <a:srgbClr val="000000"/>
               </a:solidFill>
@@ -2321,7 +2363,7 @@
       </p:grpSpPr>
       <p:sp>
         <p:nvSpPr>
-          <p:cNvPr id="45" name="PlaceHolder 1"/>
+          <p:cNvPr id="46" name="PlaceHolder 1"/>
           <p:cNvSpPr>
             <a:spLocks noGrp="1"/>
           </p:cNvSpPr>
@@ -2363,7 +2405,7 @@
       </p:sp>
       <p:sp>
         <p:nvSpPr>
-          <p:cNvPr id="46" name="PlaceHolder 2"/>
+          <p:cNvPr id="47" name="PlaceHolder 2"/>
           <p:cNvSpPr>
             <a:spLocks noGrp="1"/>
           </p:cNvSpPr>
@@ -2389,12 +2431,23 @@
             <a:normAutofit/>
           </a:bodyPr>
           <a:p>
-            <a:pPr indent="0">
+            <a:pPr marL="432000" indent="0">
               <a:spcBef>
                 <a:spcPts val="1417"/>
               </a:spcBef>
               <a:buNone/>
             </a:pPr>
+            <a:r>
+              <a:rPr b="0" lang="en-AU" sz="3200" strike="noStrike" u="none">
+                <a:solidFill>
+                  <a:srgbClr val="000000"/>
+                </a:solidFill>
+                <a:effectLst/>
+                <a:uFillTx/>
+                <a:latin typeface="Arial"/>
+              </a:rPr>
+              <a:t>For simplicity I am going to only show the tests in IPv4 or Ipv6, show both it will take too long time, all the tests are in the document</a:t>
+            </a:r>
             <a:endParaRPr b="0" lang="en-AU" sz="3200" strike="noStrike" u="none">
               <a:solidFill>
                 <a:srgbClr val="000000"/>
@@ -2566,7 +2619,7 @@
       </p:grpSpPr>
       <p:sp>
         <p:nvSpPr>
-          <p:cNvPr id="47" name="PlaceHolder 1"/>
+          <p:cNvPr id="48" name="PlaceHolder 1"/>
           <p:cNvSpPr>
             <a:spLocks noGrp="1"/>
           </p:cNvSpPr>
@@ -2608,7 +2661,7 @@
       </p:sp>
       <p:sp>
         <p:nvSpPr>
-          <p:cNvPr id="48" name="PlaceHolder 2"/>
+          <p:cNvPr id="49" name="PlaceHolder 2"/>
           <p:cNvSpPr>
             <a:spLocks noGrp="1"/>
           </p:cNvSpPr>
@@ -2634,12 +2687,28 @@
             <a:normAutofit/>
           </a:bodyPr>
           <a:p>
-            <a:pPr indent="0">
+            <a:pPr marL="432000" indent="-324000">
               <a:spcBef>
                 <a:spcPts val="1417"/>
               </a:spcBef>
-              <a:buNone/>
-            </a:pPr>
+              <a:buClr>
+                <a:srgbClr val="000000"/>
+              </a:buClr>
+              <a:buSzPct val="45000"/>
+              <a:buFont typeface="Wingdings" charset="2"/>
+              <a:buChar char=""/>
+            </a:pPr>
+            <a:r>
+              <a:rPr b="0" lang="en-AU" sz="3200" strike="noStrike" u="none">
+                <a:solidFill>
+                  <a:srgbClr val="000000"/>
+                </a:solidFill>
+                <a:effectLst/>
+                <a:uFillTx/>
+                <a:latin typeface="Arial"/>
+              </a:rPr>
+              <a:t>Testing local network connection over IPv6</a:t>
+            </a:r>
             <a:endParaRPr b="0" lang="en-AU" sz="3200" strike="noStrike" u="none">
               <a:solidFill>
                 <a:srgbClr val="000000"/>
@@ -2683,7 +2752,7 @@
       </p:grpSpPr>
       <p:sp>
         <p:nvSpPr>
-          <p:cNvPr id="49" name="PlaceHolder 1"/>
+          <p:cNvPr id="50" name="PlaceHolder 1"/>
           <p:cNvSpPr>
             <a:spLocks noGrp="1"/>
           </p:cNvSpPr>
@@ -2725,7 +2794,7 @@
       </p:sp>
       <p:sp>
         <p:nvSpPr>
-          <p:cNvPr id="50" name="PlaceHolder 2"/>
+          <p:cNvPr id="51" name="PlaceHolder 2"/>
           <p:cNvSpPr>
             <a:spLocks noGrp="1"/>
           </p:cNvSpPr>
@@ -2751,12 +2820,28 @@
             <a:normAutofit/>
           </a:bodyPr>
           <a:p>
-            <a:pPr indent="0">
+            <a:pPr marL="432000" indent="-324000">
               <a:spcBef>
                 <a:spcPts val="1417"/>
               </a:spcBef>
-              <a:buNone/>
-            </a:pPr>
+              <a:buClr>
+                <a:srgbClr val="000000"/>
+              </a:buClr>
+              <a:buSzPct val="45000"/>
+              <a:buFont typeface="Wingdings" charset="2"/>
+              <a:buChar char=""/>
+            </a:pPr>
+            <a:r>
+              <a:rPr b="0" lang="en-AU" sz="3200" strike="noStrike" u="none">
+                <a:solidFill>
+                  <a:srgbClr val="000000"/>
+                </a:solidFill>
+                <a:effectLst/>
+                <a:uFillTx/>
+                <a:latin typeface="Arial"/>
+              </a:rPr>
+              <a:t>Connection to its WEB server</a:t>
+            </a:r>
             <a:endParaRPr b="0" lang="en-AU" sz="3200" strike="noStrike" u="none">
               <a:solidFill>
                 <a:srgbClr val="000000"/>
@@ -2800,7 +2885,7 @@
       </p:grpSpPr>
       <p:sp>
         <p:nvSpPr>
-          <p:cNvPr id="51" name="PlaceHolder 1"/>
+          <p:cNvPr id="52" name="PlaceHolder 1"/>
           <p:cNvSpPr>
             <a:spLocks noGrp="1"/>
           </p:cNvSpPr>
@@ -2842,7 +2927,7 @@
       </p:sp>
       <p:sp>
         <p:nvSpPr>
-          <p:cNvPr id="52" name="PlaceHolder 2"/>
+          <p:cNvPr id="53" name="PlaceHolder 2"/>
           <p:cNvSpPr>
             <a:spLocks noGrp="1"/>
           </p:cNvSpPr>
@@ -2917,7 +3002,7 @@
       </p:grpSpPr>
       <p:sp>
         <p:nvSpPr>
-          <p:cNvPr id="53" name="PlaceHolder 1"/>
+          <p:cNvPr id="54" name="PlaceHolder 1"/>
           <p:cNvSpPr>
             <a:spLocks noGrp="1"/>
           </p:cNvSpPr>
@@ -2959,7 +3044,7 @@
       </p:sp>
       <p:sp>
         <p:nvSpPr>
-          <p:cNvPr id="54" name="PlaceHolder 2"/>
+          <p:cNvPr id="55" name="PlaceHolder 2"/>
           <p:cNvSpPr>
             <a:spLocks noGrp="1"/>
           </p:cNvSpPr>
@@ -3034,7 +3119,7 @@
       </p:grpSpPr>
       <p:sp>
         <p:nvSpPr>
-          <p:cNvPr id="55" name="PlaceHolder 1"/>
+          <p:cNvPr id="56" name="PlaceHolder 1"/>
           <p:cNvSpPr>
             <a:spLocks noGrp="1"/>
           </p:cNvSpPr>
@@ -3076,7 +3161,7 @@
       </p:sp>
       <p:sp>
         <p:nvSpPr>
-          <p:cNvPr id="56" name="PlaceHolder 2"/>
+          <p:cNvPr id="57" name="PlaceHolder 2"/>
           <p:cNvSpPr>
             <a:spLocks noGrp="1"/>
           </p:cNvSpPr>
@@ -3102,12 +3187,23 @@
             <a:normAutofit/>
           </a:bodyPr>
           <a:p>
-            <a:pPr indent="0">
+            <a:pPr marL="432000" indent="0">
               <a:spcBef>
                 <a:spcPts val="1417"/>
               </a:spcBef>
               <a:buNone/>
             </a:pPr>
+            <a:r>
+              <a:rPr b="0" lang="en-AU" sz="3200" strike="noStrike" u="none">
+                <a:solidFill>
+                  <a:srgbClr val="000000"/>
+                </a:solidFill>
+                <a:effectLst/>
+                <a:uFillTx/>
+                <a:latin typeface="Arial"/>
+              </a:rPr>
+              <a:t>Brisbane Branch is the only one that has DSL implementation, this is the blue area and works with two modems</a:t>
+            </a:r>
             <a:endParaRPr b="0" lang="en-AU" sz="3200" strike="noStrike" u="none">
               <a:solidFill>
                 <a:srgbClr val="000000"/>
@@ -3151,7 +3247,7 @@
       </p:grpSpPr>
       <p:sp>
         <p:nvSpPr>
-          <p:cNvPr id="57" name="PlaceHolder 1"/>
+          <p:cNvPr id="58" name="PlaceHolder 1"/>
           <p:cNvSpPr>
             <a:spLocks noGrp="1"/>
           </p:cNvSpPr>
@@ -3193,7 +3289,7 @@
       </p:sp>
       <p:sp>
         <p:nvSpPr>
-          <p:cNvPr id="58" name="PlaceHolder 2"/>
+          <p:cNvPr id="59" name="PlaceHolder 2"/>
           <p:cNvSpPr>
             <a:spLocks noGrp="1"/>
           </p:cNvSpPr>
@@ -3219,12 +3315,28 @@
             <a:normAutofit/>
           </a:bodyPr>
           <a:p>
-            <a:pPr indent="0">
+            <a:pPr marL="432000" indent="-324000">
               <a:spcBef>
                 <a:spcPts val="1417"/>
               </a:spcBef>
-              <a:buNone/>
-            </a:pPr>
+              <a:buClr>
+                <a:srgbClr val="000000"/>
+              </a:buClr>
+              <a:buSzPct val="45000"/>
+              <a:buFont typeface="Wingdings" charset="2"/>
+              <a:buChar char=""/>
+            </a:pPr>
+            <a:r>
+              <a:rPr b="0" lang="en-AU" sz="3200" strike="noStrike" u="none">
+                <a:solidFill>
+                  <a:srgbClr val="000000"/>
+                </a:solidFill>
+                <a:effectLst/>
+                <a:uFillTx/>
+                <a:latin typeface="Arial"/>
+              </a:rPr>
+              <a:t>Now, this is the test for local network connection over IPv4</a:t>
+            </a:r>
             <a:endParaRPr b="0" lang="en-AU" sz="3200" strike="noStrike" u="none">
               <a:solidFill>
                 <a:srgbClr val="000000"/>
@@ -3268,7 +3380,7 @@
       </p:grpSpPr>
       <p:sp>
         <p:nvSpPr>
-          <p:cNvPr id="59" name="PlaceHolder 1"/>
+          <p:cNvPr id="60" name="PlaceHolder 1"/>
           <p:cNvSpPr>
             <a:spLocks noGrp="1"/>
           </p:cNvSpPr>
@@ -3310,7 +3422,7 @@
       </p:sp>
       <p:sp>
         <p:nvSpPr>
-          <p:cNvPr id="60" name="PlaceHolder 2"/>
+          <p:cNvPr id="61" name="PlaceHolder 2"/>
           <p:cNvSpPr>
             <a:spLocks noGrp="1"/>
           </p:cNvSpPr>
@@ -3335,6 +3447,60 @@
           <a:bodyPr lIns="0" rIns="0" tIns="0" bIns="0" anchor="t">
             <a:normAutofit/>
           </a:bodyPr>
+          <a:p>
+            <a:pPr marL="432000" indent="0">
+              <a:spcBef>
+                <a:spcPts val="1417"/>
+              </a:spcBef>
+              <a:buNone/>
+            </a:pPr>
+            <a:r>
+              <a:rPr b="0" lang="en-AU" sz="3200" strike="noStrike" u="none">
+                <a:solidFill>
+                  <a:srgbClr val="000000"/>
+                </a:solidFill>
+                <a:effectLst/>
+                <a:uFillTx/>
+                <a:latin typeface="Arial"/>
+              </a:rPr>
+              <a:t>In the blue area After implement VPN this connection is no longer available, I could not fixed it.</a:t>
+            </a:r>
+            <a:endParaRPr b="0" lang="en-AU" sz="3200" strike="noStrike" u="none">
+              <a:solidFill>
+                <a:srgbClr val="000000"/>
+              </a:solidFill>
+              <a:effectLst/>
+              <a:uFillTx/>
+              <a:latin typeface="Arial"/>
+            </a:endParaRPr>
+          </a:p>
+          <a:p>
+            <a:pPr indent="0">
+              <a:spcBef>
+                <a:spcPts val="1417"/>
+              </a:spcBef>
+              <a:buNone/>
+            </a:pPr>
+            <a:r>
+              <a:rPr b="0" lang="en-AU" sz="3200" strike="noStrike" u="none">
+                <a:solidFill>
+                  <a:srgbClr val="000000"/>
+                </a:solidFill>
+                <a:effectLst/>
+                <a:uFillTx/>
+                <a:latin typeface="Arial"/>
+              </a:rPr>
+              <a:t>the rest of the network is working</a:t>
+            </a:r>
+            <a:endParaRPr b="0" lang="en-AU" sz="3200" strike="noStrike" u="none">
+              <a:solidFill>
+                <a:srgbClr val="000000"/>
+              </a:solidFill>
+              <a:effectLst/>
+              <a:uFillTx/>
+              <a:latin typeface="Arial"/>
+            </a:endParaRPr>
+          </a:p>
           <a:p>
             <a:pPr indent="0">
               <a:spcBef>
@@ -3385,7 +3551,7 @@
       </p:grpSpPr>
       <p:sp>
         <p:nvSpPr>
-          <p:cNvPr id="61" name="PlaceHolder 1"/>
+          <p:cNvPr id="62" name="PlaceHolder 1"/>
           <p:cNvSpPr>
             <a:spLocks noGrp="1"/>
           </p:cNvSpPr>
@@ -3427,7 +3593,7 @@
       </p:sp>
       <p:sp>
         <p:nvSpPr>
-          <p:cNvPr id="62" name="PlaceHolder 2"/>
+          <p:cNvPr id="63" name="PlaceHolder 2"/>
           <p:cNvSpPr>
             <a:spLocks noGrp="1"/>
           </p:cNvSpPr>
@@ -3453,12 +3619,23 @@
             <a:normAutofit/>
           </a:bodyPr>
           <a:p>
-            <a:pPr indent="0">
+            <a:pPr marL="432000" indent="0">
               <a:spcBef>
                 <a:spcPts val="1417"/>
               </a:spcBef>
               <a:buNone/>
             </a:pPr>
+            <a:r>
+              <a:rPr b="0" lang="en-AU" sz="3200" strike="noStrike" u="none">
+                <a:solidFill>
+                  <a:srgbClr val="000000"/>
+                </a:solidFill>
+                <a:effectLst/>
+                <a:uFillTx/>
+                <a:latin typeface="Arial"/>
+              </a:rPr>
+              <a:t>Now, those are the WAN test results </a:t>
+            </a:r>
             <a:endParaRPr b="0" lang="en-AU" sz="3200" strike="noStrike" u="none">
               <a:solidFill>
                 <a:srgbClr val="000000"/>
@@ -3502,7 +3679,7 @@
       </p:grpSpPr>
       <p:sp>
         <p:nvSpPr>
-          <p:cNvPr id="63" name="PlaceHolder 1"/>
+          <p:cNvPr id="64" name="PlaceHolder 1"/>
           <p:cNvSpPr>
             <a:spLocks noGrp="1"/>
           </p:cNvSpPr>
@@ -3544,7 +3721,7 @@
       </p:sp>
       <p:sp>
         <p:nvSpPr>
-          <p:cNvPr id="64" name="PlaceHolder 2"/>
+          <p:cNvPr id="65" name="PlaceHolder 2"/>
           <p:cNvSpPr>
             <a:spLocks noGrp="1"/>
           </p:cNvSpPr>
@@ -3570,12 +3747,28 @@
             <a:normAutofit/>
           </a:bodyPr>
           <a:p>
-            <a:pPr indent="0">
+            <a:pPr marL="432000" indent="-324000">
               <a:spcBef>
                 <a:spcPts val="1417"/>
               </a:spcBef>
-              <a:buNone/>
-            </a:pPr>
+              <a:buClr>
+                <a:srgbClr val="000000"/>
+              </a:buClr>
+              <a:buSzPct val="45000"/>
+              <a:buFont typeface="Wingdings" charset="2"/>
+              <a:buChar char=""/>
+            </a:pPr>
+            <a:r>
+              <a:rPr b="0" lang="en-AU" sz="3200" strike="noStrike" u="none">
+                <a:solidFill>
+                  <a:srgbClr val="000000"/>
+                </a:solidFill>
+                <a:effectLst/>
+                <a:uFillTx/>
+                <a:latin typeface="Arial"/>
+              </a:rPr>
+              <a:t>From Sydney to Brisbane over IPv4</a:t>
+            </a:r>
             <a:endParaRPr b="0" lang="en-AU" sz="3200" strike="noStrike" u="none">
               <a:solidFill>
                 <a:srgbClr val="000000"/>
@@ -3619,7 +3812,7 @@
       </p:grpSpPr>
       <p:sp>
         <p:nvSpPr>
-          <p:cNvPr id="65" name="PlaceHolder 1"/>
+          <p:cNvPr id="66" name="PlaceHolder 1"/>
           <p:cNvSpPr>
             <a:spLocks noGrp="1"/>
           </p:cNvSpPr>
@@ -3661,7 +3854,7 @@
       </p:sp>
       <p:sp>
         <p:nvSpPr>
-          <p:cNvPr id="66" name="PlaceHolder 2"/>
+          <p:cNvPr id="67" name="PlaceHolder 2"/>
           <p:cNvSpPr>
             <a:spLocks noGrp="1"/>
           </p:cNvSpPr>
@@ -3687,12 +3880,28 @@
             <a:normAutofit/>
           </a:bodyPr>
           <a:p>
-            <a:pPr indent="0">
+            <a:pPr marL="432000" indent="-324000">
               <a:spcBef>
                 <a:spcPts val="1417"/>
               </a:spcBef>
-              <a:buNone/>
-            </a:pPr>
+              <a:buClr>
+                <a:srgbClr val="000000"/>
+              </a:buClr>
+              <a:buSzPct val="45000"/>
+              <a:buFont typeface="Wingdings" charset="2"/>
+              <a:buChar char=""/>
+            </a:pPr>
+            <a:r>
+              <a:rPr b="0" lang="en-AU" sz="3200" strike="noStrike" u="none">
+                <a:solidFill>
+                  <a:srgbClr val="000000"/>
+                </a:solidFill>
+                <a:effectLst/>
+                <a:uFillTx/>
+                <a:latin typeface="Arial"/>
+              </a:rPr>
+              <a:t>From Brisbane to Sydney over IPv6</a:t>
+            </a:r>
             <a:endParaRPr b="0" lang="en-AU" sz="3200" strike="noStrike" u="none">
               <a:solidFill>
                 <a:srgbClr val="000000"/>
@@ -3897,7 +4106,7 @@
       </p:grpSpPr>
       <p:sp>
         <p:nvSpPr>
-          <p:cNvPr id="67" name="PlaceHolder 1"/>
+          <p:cNvPr id="68" name="PlaceHolder 1"/>
           <p:cNvSpPr>
             <a:spLocks noGrp="1"/>
           </p:cNvSpPr>
@@ -3939,7 +4148,7 @@
       </p:sp>
       <p:sp>
         <p:nvSpPr>
-          <p:cNvPr id="68" name="PlaceHolder 2"/>
+          <p:cNvPr id="69" name="PlaceHolder 2"/>
           <p:cNvSpPr>
             <a:spLocks noGrp="1"/>
           </p:cNvSpPr>
@@ -3964,6 +4173,38 @@
           <a:bodyPr lIns="0" rIns="0" tIns="0" bIns="0" anchor="t">
             <a:normAutofit/>
           </a:bodyPr>
+          <a:p>
+            <a:pPr marL="432000" indent="-324000">
+              <a:spcBef>
+                <a:spcPts val="1417"/>
+              </a:spcBef>
+              <a:buClr>
+                <a:srgbClr val="000000"/>
+              </a:buClr>
+              <a:buSzPct val="45000"/>
+              <a:buFont typeface="Wingdings" charset="2"/>
+              <a:buChar char=""/>
+            </a:pPr>
+            <a:r>
+              <a:rPr b="0" lang="en-AU" sz="3200" strike="noStrike" u="none">
+                <a:solidFill>
+                  <a:srgbClr val="000000"/>
+                </a:solidFill>
+                <a:effectLst/>
+                <a:uFillTx/>
+                <a:latin typeface="Arial"/>
+              </a:rPr>
+              <a:t>Secure remote access by login on network devices</a:t>
+            </a:r>
+            <a:endParaRPr b="0" lang="en-AU" sz="3200" strike="noStrike" u="none">
+              <a:solidFill>
+                <a:srgbClr val="000000"/>
+              </a:solidFill>
+              <a:effectLst/>
+              <a:uFillTx/>
+              <a:latin typeface="Arial"/>
+            </a:endParaRPr>
+          </a:p>
           <a:p>
             <a:pPr indent="0">
               <a:spcBef>
@@ -3971,6 +4212,49 @@
               </a:spcBef>
               <a:buNone/>
             </a:pPr>
+            <a:endParaRPr b="0" lang="en-AU" sz="3200" strike="noStrike" u="none">
+              <a:solidFill>
+                <a:srgbClr val="000000"/>
+              </a:solidFill>
+              <a:effectLst/>
+              <a:uFillTx/>
+              <a:latin typeface="Arial"/>
+            </a:endParaRPr>
+          </a:p>
+          <a:p>
+            <a:pPr indent="0">
+              <a:spcBef>
+                <a:spcPts val="1417"/>
+              </a:spcBef>
+              <a:buNone/>
+            </a:pPr>
+            <a:endParaRPr b="0" lang="en-AU" sz="3200" strike="noStrike" u="none">
+              <a:solidFill>
+                <a:srgbClr val="000000"/>
+              </a:solidFill>
+              <a:effectLst/>
+              <a:uFillTx/>
+              <a:latin typeface="Arial"/>
+            </a:endParaRPr>
+          </a:p>
+          <a:p>
+            <a:pPr indent="0">
+              <a:spcBef>
+                <a:spcPts val="1417"/>
+              </a:spcBef>
+              <a:buNone/>
+            </a:pPr>
+            <a:r>
+              <a:rPr b="0" lang="en-AU" sz="3200" strike="noStrike" u="none">
+                <a:solidFill>
+                  <a:srgbClr val="000000"/>
+                </a:solidFill>
+                <a:effectLst/>
+                <a:uFillTx/>
+                <a:latin typeface="Arial"/>
+              </a:rPr>
+              <a:t>Implemented on routers and switches</a:t>
+            </a:r>
             <a:endParaRPr b="0" lang="en-AU" sz="3200" strike="noStrike" u="none">
               <a:solidFill>
                 <a:srgbClr val="000000"/>
@@ -4014,7 +4298,7 @@
       </p:grpSpPr>
       <p:sp>
         <p:nvSpPr>
-          <p:cNvPr id="69" name="PlaceHolder 1"/>
+          <p:cNvPr id="70" name="PlaceHolder 1"/>
           <p:cNvSpPr>
             <a:spLocks noGrp="1"/>
           </p:cNvSpPr>
@@ -4056,7 +4340,7 @@
       </p:sp>
       <p:sp>
         <p:nvSpPr>
-          <p:cNvPr id="70" name="PlaceHolder 2"/>
+          <p:cNvPr id="71" name="PlaceHolder 2"/>
           <p:cNvSpPr>
             <a:spLocks noGrp="1"/>
           </p:cNvSpPr>
@@ -4131,7 +4415,7 @@
       </p:grpSpPr>
       <p:sp>
         <p:nvSpPr>
-          <p:cNvPr id="71" name="PlaceHolder 1"/>
+          <p:cNvPr id="72" name="PlaceHolder 1"/>
           <p:cNvSpPr>
             <a:spLocks noGrp="1"/>
           </p:cNvSpPr>
@@ -4173,7 +4457,7 @@
       </p:sp>
       <p:sp>
         <p:nvSpPr>
-          <p:cNvPr id="72" name="PlaceHolder 2"/>
+          <p:cNvPr id="73" name="PlaceHolder 2"/>
           <p:cNvSpPr>
             <a:spLocks noGrp="1"/>
           </p:cNvSpPr>
@@ -4248,7 +4532,7 @@
       </p:grpSpPr>
       <p:sp>
         <p:nvSpPr>
-          <p:cNvPr id="73" name="PlaceHolder 1"/>
+          <p:cNvPr id="74" name="PlaceHolder 1"/>
           <p:cNvSpPr>
             <a:spLocks noGrp="1"/>
           </p:cNvSpPr>
@@ -4290,7 +4574,7 @@
       </p:sp>
       <p:sp>
         <p:nvSpPr>
-          <p:cNvPr id="74" name="PlaceHolder 2"/>
+          <p:cNvPr id="75" name="PlaceHolder 2"/>
           <p:cNvSpPr>
             <a:spLocks noGrp="1"/>
           </p:cNvSpPr>
@@ -4365,7 +4649,7 @@
       </p:grpSpPr>
       <p:sp>
         <p:nvSpPr>
-          <p:cNvPr id="75" name="PlaceHolder 1"/>
+          <p:cNvPr id="76" name="PlaceHolder 1"/>
           <p:cNvSpPr>
             <a:spLocks noGrp="1"/>
           </p:cNvSpPr>
@@ -4407,7 +4691,7 @@
       </p:sp>
       <p:sp>
         <p:nvSpPr>
-          <p:cNvPr id="76" name="PlaceHolder 2"/>
+          <p:cNvPr id="77" name="PlaceHolder 2"/>
           <p:cNvSpPr>
             <a:spLocks noGrp="1"/>
           </p:cNvSpPr>
@@ -4433,12 +4717,71 @@
             <a:normAutofit/>
           </a:bodyPr>
           <a:p>
-            <a:pPr indent="0">
+            <a:pPr marL="432000" indent="-324000">
               <a:spcBef>
                 <a:spcPts val="1417"/>
               </a:spcBef>
-              <a:buNone/>
-            </a:pPr>
+              <a:buClr>
+                <a:srgbClr val="000000"/>
+              </a:buClr>
+              <a:buSzPct val="45000"/>
+              <a:buFont typeface="Wingdings" charset="2"/>
+              <a:buChar char=""/>
+            </a:pPr>
+            <a:r>
+              <a:rPr b="0" lang="en-AU" sz="3200" strike="noStrike" u="none">
+                <a:solidFill>
+                  <a:srgbClr val="000000"/>
+                </a:solidFill>
+                <a:effectLst/>
+                <a:uFillTx/>
+                <a:latin typeface="Arial"/>
+              </a:rPr>
+              <a:t>I have implemented a DHCP-router to avoid having dedicated servers.</a:t>
+            </a:r>
+            <a:endParaRPr b="0" lang="en-AU" sz="3200" strike="noStrike" u="none">
+              <a:solidFill>
+                <a:srgbClr val="000000"/>
+              </a:solidFill>
+              <a:effectLst/>
+              <a:uFillTx/>
+              <a:latin typeface="Arial"/>
+            </a:endParaRPr>
+          </a:p>
+          <a:p>
+            <a:pPr marL="432000" indent="0">
+              <a:spcBef>
+                <a:spcPts val="1417"/>
+              </a:spcBef>
+              <a:buNone/>
+            </a:pPr>
+            <a:endParaRPr b="0" lang="en-AU" sz="3200" strike="noStrike" u="none">
+              <a:solidFill>
+                <a:srgbClr val="000000"/>
+              </a:solidFill>
+              <a:effectLst/>
+              <a:uFillTx/>
+              <a:latin typeface="Arial"/>
+            </a:endParaRPr>
+          </a:p>
+          <a:p>
+            <a:pPr marL="432000" indent="0">
+              <a:spcBef>
+                <a:spcPts val="1417"/>
+              </a:spcBef>
+              <a:buNone/>
+            </a:pPr>
+            <a:r>
+              <a:rPr b="0" lang="en-AU" sz="3200" strike="noStrike" u="none">
+                <a:solidFill>
+                  <a:srgbClr val="000000"/>
+                </a:solidFill>
+                <a:effectLst/>
+                <a:uFillTx/>
+                <a:latin typeface="Arial"/>
+              </a:rPr>
+              <a:t> </a:t>
+            </a:r>
             <a:endParaRPr b="0" lang="en-AU" sz="3200" strike="noStrike" u="none">
               <a:solidFill>
                 <a:srgbClr val="000000"/>
@@ -4482,7 +4825,7 @@
       </p:grpSpPr>
       <p:sp>
         <p:nvSpPr>
-          <p:cNvPr id="77" name="PlaceHolder 1"/>
+          <p:cNvPr id="78" name="PlaceHolder 1"/>
           <p:cNvSpPr>
             <a:spLocks noGrp="1"/>
           </p:cNvSpPr>
@@ -4524,7 +4867,7 @@
       </p:sp>
       <p:sp>
         <p:nvSpPr>
-          <p:cNvPr id="78" name="PlaceHolder 2"/>
+          <p:cNvPr id="79" name="PlaceHolder 2"/>
           <p:cNvSpPr>
             <a:spLocks noGrp="1"/>
           </p:cNvSpPr>
@@ -4599,7 +4942,7 @@
       </p:grpSpPr>
       <p:sp>
         <p:nvSpPr>
-          <p:cNvPr id="79" name="PlaceHolder 1"/>
+          <p:cNvPr id="80" name="PlaceHolder 1"/>
           <p:cNvSpPr>
             <a:spLocks noGrp="1"/>
           </p:cNvSpPr>
@@ -4641,7 +4984,7 @@
       </p:sp>
       <p:sp>
         <p:nvSpPr>
-          <p:cNvPr id="80" name="PlaceHolder 2"/>
+          <p:cNvPr id="81" name="PlaceHolder 2"/>
           <p:cNvSpPr>
             <a:spLocks noGrp="1"/>
           </p:cNvSpPr>
@@ -4716,7 +5059,7 @@
       </p:grpSpPr>
       <p:sp>
         <p:nvSpPr>
-          <p:cNvPr id="81" name="PlaceHolder 1"/>
+          <p:cNvPr id="82" name="PlaceHolder 1"/>
           <p:cNvSpPr>
             <a:spLocks noGrp="1"/>
           </p:cNvSpPr>
@@ -4758,7 +5101,7 @@
       </p:sp>
       <p:sp>
         <p:nvSpPr>
-          <p:cNvPr id="82" name="PlaceHolder 2"/>
+          <p:cNvPr id="83" name="PlaceHolder 2"/>
           <p:cNvSpPr>
             <a:spLocks noGrp="1"/>
           </p:cNvSpPr>
@@ -4784,12 +5127,23 @@
             <a:normAutofit/>
           </a:bodyPr>
           <a:p>
-            <a:pPr indent="0">
+            <a:pPr marL="432000" indent="0">
               <a:spcBef>
                 <a:spcPts val="1417"/>
               </a:spcBef>
               <a:buNone/>
             </a:pPr>
+            <a:r>
+              <a:rPr b="0" lang="en-AU" sz="3200" strike="noStrike" u="none">
+                <a:solidFill>
+                  <a:srgbClr val="000000"/>
+                </a:solidFill>
+                <a:effectLst/>
+                <a:uFillTx/>
+                <a:latin typeface="Arial"/>
+              </a:rPr>
+              <a:t>I have implemented LACP to combines 3  links into a logical connection because I am also using a second switch layer 3 to redundancy on each sub-network.</a:t>
+            </a:r>
             <a:endParaRPr b="0" lang="en-AU" sz="3200" strike="noStrike" u="none">
               <a:solidFill>
                 <a:srgbClr val="000000"/>
@@ -4833,7 +5187,7 @@
       </p:grpSpPr>
       <p:sp>
         <p:nvSpPr>
-          <p:cNvPr id="83" name="PlaceHolder 1"/>
+          <p:cNvPr id="84" name="PlaceHolder 1"/>
           <p:cNvSpPr>
             <a:spLocks noGrp="1"/>
           </p:cNvSpPr>
@@ -4875,7 +5229,7 @@
       </p:sp>
       <p:sp>
         <p:nvSpPr>
-          <p:cNvPr id="84" name="PlaceHolder 2"/>
+          <p:cNvPr id="85" name="PlaceHolder 2"/>
           <p:cNvSpPr>
             <a:spLocks noGrp="1"/>
           </p:cNvSpPr>
@@ -4950,7 +5304,7 @@
       </p:grpSpPr>
       <p:sp>
         <p:nvSpPr>
-          <p:cNvPr id="85" name="PlaceHolder 1"/>
+          <p:cNvPr id="86" name="PlaceHolder 1"/>
           <p:cNvSpPr>
             <a:spLocks noGrp="1"/>
           </p:cNvSpPr>
@@ -4992,7 +5346,7 @@
       </p:sp>
       <p:sp>
         <p:nvSpPr>
-          <p:cNvPr id="86" name="PlaceHolder 2"/>
+          <p:cNvPr id="87" name="PlaceHolder 2"/>
           <p:cNvSpPr>
             <a:spLocks noGrp="1"/>
           </p:cNvSpPr>
@@ -5200,7 +5554,7 @@
       </p:grpSpPr>
       <p:sp>
         <p:nvSpPr>
-          <p:cNvPr id="87" name="PlaceHolder 1"/>
+          <p:cNvPr id="88" name="PlaceHolder 1"/>
           <p:cNvSpPr>
             <a:spLocks noGrp="1"/>
           </p:cNvSpPr>
@@ -5242,7 +5596,7 @@
       </p:sp>
       <p:sp>
         <p:nvSpPr>
-          <p:cNvPr id="88" name="PlaceHolder 2"/>
+          <p:cNvPr id="89" name="PlaceHolder 2"/>
           <p:cNvSpPr>
             <a:spLocks noGrp="1"/>
           </p:cNvSpPr>
@@ -5317,7 +5671,7 @@
       </p:grpSpPr>
       <p:sp>
         <p:nvSpPr>
-          <p:cNvPr id="89" name="PlaceHolder 1"/>
+          <p:cNvPr id="90" name="PlaceHolder 1"/>
           <p:cNvSpPr>
             <a:spLocks noGrp="1"/>
           </p:cNvSpPr>
@@ -5359,7 +5713,7 @@
       </p:sp>
       <p:sp>
         <p:nvSpPr>
-          <p:cNvPr id="90" name="PlaceHolder 2"/>
+          <p:cNvPr id="91" name="PlaceHolder 2"/>
           <p:cNvSpPr>
             <a:spLocks noGrp="1"/>
           </p:cNvSpPr>
@@ -5385,12 +5739,23 @@
             <a:normAutofit/>
           </a:bodyPr>
           <a:p>
-            <a:pPr indent="0">
+            <a:pPr marL="432000" indent="0">
               <a:spcBef>
                 <a:spcPts val="1417"/>
               </a:spcBef>
               <a:buNone/>
             </a:pPr>
+            <a:r>
+              <a:rPr b="0" lang="en-AU" sz="3200" strike="noStrike" u="none">
+                <a:solidFill>
+                  <a:srgbClr val="000000"/>
+                </a:solidFill>
+                <a:effectLst/>
+                <a:uFillTx/>
+                <a:latin typeface="Arial"/>
+              </a:rPr>
+              <a:t>I have implemented HSRP on Sydney Branch to provide local redundancy</a:t>
+            </a:r>
             <a:endParaRPr b="0" lang="en-AU" sz="3200" strike="noStrike" u="none">
               <a:solidFill>
                 <a:srgbClr val="000000"/>
@@ -5434,7 +5799,7 @@
       </p:grpSpPr>
       <p:sp>
         <p:nvSpPr>
-          <p:cNvPr id="91" name="PlaceHolder 1"/>
+          <p:cNvPr id="92" name="PlaceHolder 1"/>
           <p:cNvSpPr>
             <a:spLocks noGrp="1"/>
           </p:cNvSpPr>
@@ -5476,7 +5841,7 @@
       </p:sp>
       <p:sp>
         <p:nvSpPr>
-          <p:cNvPr id="92" name="PlaceHolder 2"/>
+          <p:cNvPr id="93" name="PlaceHolder 2"/>
           <p:cNvSpPr>
             <a:spLocks noGrp="1"/>
           </p:cNvSpPr>
@@ -5551,7 +5916,7 @@
       </p:grpSpPr>
       <p:sp>
         <p:nvSpPr>
-          <p:cNvPr id="93" name="PlaceHolder 1"/>
+          <p:cNvPr id="94" name="PlaceHolder 1"/>
           <p:cNvSpPr>
             <a:spLocks noGrp="1"/>
           </p:cNvSpPr>
@@ -5593,7 +5958,7 @@
       </p:sp>
       <p:sp>
         <p:nvSpPr>
-          <p:cNvPr id="94" name="PlaceHolder 2"/>
+          <p:cNvPr id="95" name="PlaceHolder 2"/>
           <p:cNvSpPr>
             <a:spLocks noGrp="1"/>
           </p:cNvSpPr>
@@ -5668,7 +6033,7 @@
       </p:grpSpPr>
       <p:sp>
         <p:nvSpPr>
-          <p:cNvPr id="95" name="PlaceHolder 1"/>
+          <p:cNvPr id="96" name="PlaceHolder 1"/>
           <p:cNvSpPr>
             <a:spLocks noGrp="1"/>
           </p:cNvSpPr>
@@ -5710,7 +6075,7 @@
       </p:sp>
       <p:sp>
         <p:nvSpPr>
-          <p:cNvPr id="96" name="PlaceHolder 2"/>
+          <p:cNvPr id="97" name="PlaceHolder 2"/>
           <p:cNvSpPr>
             <a:spLocks noGrp="1"/>
           </p:cNvSpPr>
@@ -5785,7 +6150,7 @@
       </p:grpSpPr>
       <p:sp>
         <p:nvSpPr>
-          <p:cNvPr id="97" name="PlaceHolder 1"/>
+          <p:cNvPr id="98" name="PlaceHolder 1"/>
           <p:cNvSpPr>
             <a:spLocks noGrp="1"/>
           </p:cNvSpPr>
@@ -5827,7 +6192,7 @@
       </p:sp>
       <p:sp>
         <p:nvSpPr>
-          <p:cNvPr id="98" name="PlaceHolder 2"/>
+          <p:cNvPr id="99" name="PlaceHolder 2"/>
           <p:cNvSpPr>
             <a:spLocks noGrp="1"/>
           </p:cNvSpPr>
@@ -5853,12 +6218,23 @@
             <a:normAutofit/>
           </a:bodyPr>
           <a:p>
-            <a:pPr indent="0">
+            <a:pPr marL="432000" indent="0">
               <a:spcBef>
                 <a:spcPts val="1417"/>
               </a:spcBef>
               <a:buNone/>
             </a:pPr>
+            <a:r>
+              <a:rPr b="0" lang="en-AU" sz="3200" strike="noStrike" u="none">
+                <a:solidFill>
+                  <a:srgbClr val="000000"/>
+                </a:solidFill>
+                <a:effectLst/>
+                <a:uFillTx/>
+                <a:latin typeface="Arial"/>
+              </a:rPr>
+              <a:t>I have implemented OSPF to have dynamic routing between both branches</a:t>
+            </a:r>
             <a:endParaRPr b="0" lang="en-AU" sz="3200" strike="noStrike" u="none">
               <a:solidFill>
                 <a:srgbClr val="000000"/>
@@ -5902,7 +6278,7 @@
       </p:grpSpPr>
       <p:sp>
         <p:nvSpPr>
-          <p:cNvPr id="99" name="PlaceHolder 1"/>
+          <p:cNvPr id="100" name="PlaceHolder 1"/>
           <p:cNvSpPr>
             <a:spLocks noGrp="1"/>
           </p:cNvSpPr>
@@ -5944,7 +6320,7 @@
       </p:sp>
       <p:sp>
         <p:nvSpPr>
-          <p:cNvPr id="100" name="PlaceHolder 2"/>
+          <p:cNvPr id="101" name="PlaceHolder 2"/>
           <p:cNvSpPr>
             <a:spLocks noGrp="1"/>
           </p:cNvSpPr>
@@ -6019,7 +6395,7 @@
       </p:grpSpPr>
       <p:sp>
         <p:nvSpPr>
-          <p:cNvPr id="101" name="PlaceHolder 1"/>
+          <p:cNvPr id="102" name="PlaceHolder 1"/>
           <p:cNvSpPr>
             <a:spLocks noGrp="1"/>
           </p:cNvSpPr>
@@ -6061,7 +6437,7 @@
       </p:sp>
       <p:sp>
         <p:nvSpPr>
-          <p:cNvPr id="102" name="PlaceHolder 2"/>
+          <p:cNvPr id="103" name="PlaceHolder 2"/>
           <p:cNvSpPr>
             <a:spLocks noGrp="1"/>
           </p:cNvSpPr>
@@ -6136,7 +6512,7 @@
       </p:grpSpPr>
       <p:sp>
         <p:nvSpPr>
-          <p:cNvPr id="103" name="PlaceHolder 1"/>
+          <p:cNvPr id="104" name="PlaceHolder 1"/>
           <p:cNvSpPr>
             <a:spLocks noGrp="1"/>
           </p:cNvSpPr>
@@ -6178,7 +6554,7 @@
       </p:sp>
       <p:sp>
         <p:nvSpPr>
-          <p:cNvPr id="104" name="PlaceHolder 2"/>
+          <p:cNvPr id="105" name="PlaceHolder 2"/>
           <p:cNvSpPr>
             <a:spLocks noGrp="1"/>
           </p:cNvSpPr>
@@ -6253,7 +6629,7 @@
       </p:grpSpPr>
       <p:sp>
         <p:nvSpPr>
-          <p:cNvPr id="105" name="PlaceHolder 1"/>
+          <p:cNvPr id="106" name="PlaceHolder 1"/>
           <p:cNvSpPr>
             <a:spLocks noGrp="1"/>
           </p:cNvSpPr>
@@ -6295,7 +6671,7 @@
       </p:sp>
       <p:sp>
         <p:nvSpPr>
-          <p:cNvPr id="106" name="PlaceHolder 2"/>
+          <p:cNvPr id="107" name="PlaceHolder 2"/>
           <p:cNvSpPr>
             <a:spLocks noGrp="1"/>
           </p:cNvSpPr>
@@ -6503,7 +6879,7 @@
       </p:grpSpPr>
       <p:sp>
         <p:nvSpPr>
-          <p:cNvPr id="107" name="PlaceHolder 1"/>
+          <p:cNvPr id="108" name="PlaceHolder 1"/>
           <p:cNvSpPr>
             <a:spLocks noGrp="1"/>
           </p:cNvSpPr>
@@ -6545,7 +6921,7 @@
       </p:sp>
       <p:sp>
         <p:nvSpPr>
-          <p:cNvPr id="108" name="PlaceHolder 2"/>
+          <p:cNvPr id="109" name="PlaceHolder 2"/>
           <p:cNvSpPr>
             <a:spLocks noGrp="1"/>
           </p:cNvSpPr>
@@ -6571,12 +6947,23 @@
             <a:normAutofit/>
           </a:bodyPr>
           <a:p>
-            <a:pPr indent="0">
+            <a:pPr marL="432000" indent="0">
               <a:spcBef>
                 <a:spcPts val="1417"/>
               </a:spcBef>
               <a:buNone/>
             </a:pPr>
+            <a:r>
+              <a:rPr b="0" lang="en-AU" sz="3200" strike="noStrike" u="none">
+                <a:solidFill>
+                  <a:srgbClr val="000000"/>
+                </a:solidFill>
+                <a:effectLst/>
+                <a:uFillTx/>
+                <a:latin typeface="Arial"/>
+              </a:rPr>
+              <a:t>Rules that I have implemented them for allowing traffic among Sydney and Brisbane Branches networks."</a:t>
+            </a:r>
             <a:endParaRPr b="0" lang="en-AU" sz="3200" strike="noStrike" u="none">
               <a:solidFill>
                 <a:srgbClr val="000000"/>
@@ -6620,7 +7007,7 @@
       </p:grpSpPr>
       <p:sp>
         <p:nvSpPr>
-          <p:cNvPr id="109" name="PlaceHolder 1"/>
+          <p:cNvPr id="110" name="PlaceHolder 1"/>
           <p:cNvSpPr>
             <a:spLocks noGrp="1"/>
           </p:cNvSpPr>
@@ -6662,7 +7049,7 @@
       </p:sp>
       <p:sp>
         <p:nvSpPr>
-          <p:cNvPr id="110" name="PlaceHolder 2"/>
+          <p:cNvPr id="111" name="PlaceHolder 2"/>
           <p:cNvSpPr>
             <a:spLocks noGrp="1"/>
           </p:cNvSpPr>
@@ -6737,7 +7124,7 @@
       </p:grpSpPr>
       <p:sp>
         <p:nvSpPr>
-          <p:cNvPr id="111" name="PlaceHolder 1"/>
+          <p:cNvPr id="112" name="PlaceHolder 1"/>
           <p:cNvSpPr>
             <a:spLocks noGrp="1"/>
           </p:cNvSpPr>
@@ -6779,7 +7166,7 @@
       </p:sp>
       <p:sp>
         <p:nvSpPr>
-          <p:cNvPr id="112" name="PlaceHolder 2"/>
+          <p:cNvPr id="113" name="PlaceHolder 2"/>
           <p:cNvSpPr>
             <a:spLocks noGrp="1"/>
           </p:cNvSpPr>
@@ -6854,7 +7241,7 @@
       </p:grpSpPr>
       <p:sp>
         <p:nvSpPr>
-          <p:cNvPr id="113" name="PlaceHolder 1"/>
+          <p:cNvPr id="114" name="PlaceHolder 1"/>
           <p:cNvSpPr>
             <a:spLocks noGrp="1"/>
           </p:cNvSpPr>
@@ -6896,7 +7283,7 @@
       </p:sp>
       <p:sp>
         <p:nvSpPr>
-          <p:cNvPr id="114" name="PlaceHolder 2"/>
+          <p:cNvPr id="115" name="PlaceHolder 2"/>
           <p:cNvSpPr>
             <a:spLocks noGrp="1"/>
           </p:cNvSpPr>
@@ -6922,12 +7309,50 @@
             <a:normAutofit/>
           </a:bodyPr>
           <a:p>
-            <a:pPr indent="0">
+            <a:pPr marL="432000" indent="-324000">
               <a:spcBef>
                 <a:spcPts val="1417"/>
               </a:spcBef>
-              <a:buNone/>
-            </a:pPr>
+              <a:buClr>
+                <a:srgbClr val="000000"/>
+              </a:buClr>
+              <a:buSzPct val="45000"/>
+              <a:buFont typeface="Wingdings" charset="2"/>
+              <a:buChar char=""/>
+            </a:pPr>
+            <a:r>
+              <a:rPr b="0" lang="en-AU" sz="3200" strike="noStrike" u="none">
+                <a:solidFill>
+                  <a:srgbClr val="000000"/>
+                </a:solidFill>
+                <a:effectLst/>
+                <a:uFillTx/>
+                <a:latin typeface="Arial"/>
+              </a:rPr>
+              <a:t>I have implemented VPN with</a:t>
+            </a:r>
+            <a:r>
+              <a:rPr b="0" lang="en-AU" sz="3200" strike="noStrike" u="none">
+                <a:solidFill>
+                  <a:srgbClr val="000000"/>
+                </a:solidFill>
+                <a:effectLst/>
+                <a:uFillTx/>
+                <a:latin typeface="Arial"/>
+              </a:rPr>
+              <a:t>	</a:t>
+            </a:r>
+            <a:r>
+              <a:rPr b="0" lang="en-AU" sz="3200" strike="noStrike" u="none">
+                <a:solidFill>
+                  <a:srgbClr val="000000"/>
+                </a:solidFill>
+                <a:effectLst/>
+                <a:uFillTx/>
+                <a:latin typeface="Arial"/>
+              </a:rPr>
+              <a:t> IPsec protocol to Create a secure network over the Internet between protecting data confidentiality and integrity.</a:t>
+            </a:r>
             <a:endParaRPr b="0" lang="en-AU" sz="3200" strike="noStrike" u="none">
               <a:solidFill>
                 <a:srgbClr val="000000"/>
@@ -6971,7 +7396,7 @@
       </p:grpSpPr>
       <p:sp>
         <p:nvSpPr>
-          <p:cNvPr id="115" name="PlaceHolder 1"/>
+          <p:cNvPr id="116" name="PlaceHolder 1"/>
           <p:cNvSpPr>
             <a:spLocks noGrp="1"/>
           </p:cNvSpPr>
@@ -7013,7 +7438,7 @@
       </p:sp>
       <p:sp>
         <p:nvSpPr>
-          <p:cNvPr id="116" name="PlaceHolder 2"/>
+          <p:cNvPr id="117" name="PlaceHolder 2"/>
           <p:cNvSpPr>
             <a:spLocks noGrp="1"/>
           </p:cNvSpPr>
@@ -7088,7 +7513,7 @@
       </p:grpSpPr>
       <p:sp>
         <p:nvSpPr>
-          <p:cNvPr id="117" name="PlaceHolder 1"/>
+          <p:cNvPr id="118" name="PlaceHolder 1"/>
           <p:cNvSpPr>
             <a:spLocks noGrp="1"/>
           </p:cNvSpPr>
@@ -7130,7 +7555,7 @@
       </p:sp>
       <p:sp>
         <p:nvSpPr>
-          <p:cNvPr id="118" name="PlaceHolder 2"/>
+          <p:cNvPr id="119" name="PlaceHolder 2"/>
           <p:cNvSpPr>
             <a:spLocks noGrp="1"/>
           </p:cNvSpPr>
@@ -7205,7 +7630,7 @@
       </p:grpSpPr>
       <p:sp>
         <p:nvSpPr>
-          <p:cNvPr id="119" name="PlaceHolder 1"/>
+          <p:cNvPr id="120" name="PlaceHolder 1"/>
           <p:cNvSpPr>
             <a:spLocks noGrp="1"/>
           </p:cNvSpPr>
@@ -7247,7 +7672,7 @@
       </p:sp>
       <p:sp>
         <p:nvSpPr>
-          <p:cNvPr id="120" name="PlaceHolder 2"/>
+          <p:cNvPr id="121" name="PlaceHolder 2"/>
           <p:cNvSpPr>
             <a:spLocks noGrp="1"/>
           </p:cNvSpPr>
@@ -7322,7 +7747,7 @@
       </p:grpSpPr>
       <p:sp>
         <p:nvSpPr>
-          <p:cNvPr id="121" name="PlaceHolder 1"/>
+          <p:cNvPr id="122" name="PlaceHolder 1"/>
           <p:cNvSpPr>
             <a:spLocks noGrp="1"/>
           </p:cNvSpPr>
@@ -7364,7 +7789,7 @@
       </p:sp>
       <p:sp>
         <p:nvSpPr>
-          <p:cNvPr id="122" name="PlaceHolder 2"/>
+          <p:cNvPr id="123" name="PlaceHolder 2"/>
           <p:cNvSpPr>
             <a:spLocks noGrp="1"/>
           </p:cNvSpPr>
@@ -7439,7 +7864,7 @@
       </p:grpSpPr>
       <p:sp>
         <p:nvSpPr>
-          <p:cNvPr id="123" name="PlaceHolder 1"/>
+          <p:cNvPr id="124" name="PlaceHolder 1"/>
           <p:cNvSpPr>
             <a:spLocks noGrp="1"/>
           </p:cNvSpPr>
@@ -7481,7 +7906,7 @@
       </p:sp>
       <p:sp>
         <p:nvSpPr>
-          <p:cNvPr id="124" name="PlaceHolder 2"/>
+          <p:cNvPr id="125" name="PlaceHolder 2"/>
           <p:cNvSpPr>
             <a:spLocks noGrp="1"/>
           </p:cNvSpPr>
@@ -7556,7 +7981,7 @@
       </p:grpSpPr>
       <p:sp>
         <p:nvSpPr>
-          <p:cNvPr id="125" name="PlaceHolder 1"/>
+          <p:cNvPr id="126" name="PlaceHolder 1"/>
           <p:cNvSpPr>
             <a:spLocks noGrp="1"/>
           </p:cNvSpPr>
@@ -7598,7 +8023,7 @@
       </p:sp>
       <p:sp>
         <p:nvSpPr>
-          <p:cNvPr id="126" name="PlaceHolder 2"/>
+          <p:cNvPr id="127" name="PlaceHolder 2"/>
           <p:cNvSpPr>
             <a:spLocks noGrp="1"/>
           </p:cNvSpPr>
@@ -7806,7 +8231,7 @@
       </p:grpSpPr>
       <p:sp>
         <p:nvSpPr>
-          <p:cNvPr id="127" name="PlaceHolder 1"/>
+          <p:cNvPr id="128" name="PlaceHolder 1"/>
           <p:cNvSpPr>
             <a:spLocks noGrp="1"/>
           </p:cNvSpPr>
@@ -7848,7 +8273,7 @@
       </p:sp>
       <p:sp>
         <p:nvSpPr>
-          <p:cNvPr id="128" name="PlaceHolder 2"/>
+          <p:cNvPr id="129" name="PlaceHolder 2"/>
           <p:cNvSpPr>
             <a:spLocks noGrp="1"/>
           </p:cNvSpPr>
@@ -7923,7 +8348,7 @@
       </p:grpSpPr>
       <p:sp>
         <p:nvSpPr>
-          <p:cNvPr id="129" name="PlaceHolder 1"/>
+          <p:cNvPr id="130" name="PlaceHolder 1"/>
           <p:cNvSpPr>
             <a:spLocks noGrp="1"/>
           </p:cNvSpPr>
@@ -7965,7 +8390,7 @@
       </p:sp>
       <p:sp>
         <p:nvSpPr>
-          <p:cNvPr id="130" name="PlaceHolder 2"/>
+          <p:cNvPr id="131" name="PlaceHolder 2"/>
           <p:cNvSpPr>
             <a:spLocks noGrp="1"/>
           </p:cNvSpPr>
@@ -8040,7 +8465,7 @@
       </p:grpSpPr>
       <p:sp>
         <p:nvSpPr>
-          <p:cNvPr id="131" name="PlaceHolder 1"/>
+          <p:cNvPr id="132" name="PlaceHolder 1"/>
           <p:cNvSpPr>
             <a:spLocks noGrp="1"/>
           </p:cNvSpPr>
@@ -8082,7 +8507,7 @@
       </p:sp>
       <p:sp>
         <p:nvSpPr>
-          <p:cNvPr id="132" name="PlaceHolder 2"/>
+          <p:cNvPr id="133" name="PlaceHolder 2"/>
           <p:cNvSpPr>
             <a:spLocks noGrp="1"/>
           </p:cNvSpPr>
@@ -8157,7 +8582,7 @@
       </p:grpSpPr>
       <p:sp>
         <p:nvSpPr>
-          <p:cNvPr id="133" name="PlaceHolder 1"/>
+          <p:cNvPr id="134" name="PlaceHolder 1"/>
           <p:cNvSpPr>
             <a:spLocks noGrp="1"/>
           </p:cNvSpPr>
@@ -8199,7 +8624,7 @@
       </p:sp>
       <p:sp>
         <p:nvSpPr>
-          <p:cNvPr id="134" name="PlaceHolder 2"/>
+          <p:cNvPr id="135" name="PlaceHolder 2"/>
           <p:cNvSpPr>
             <a:spLocks noGrp="1"/>
           </p:cNvSpPr>
@@ -8274,7 +8699,7 @@
       </p:grpSpPr>
       <p:sp>
         <p:nvSpPr>
-          <p:cNvPr id="135" name="PlaceHolder 1"/>
+          <p:cNvPr id="136" name="PlaceHolder 1"/>
           <p:cNvSpPr>
             <a:spLocks noGrp="1"/>
           </p:cNvSpPr>
@@ -8316,7 +8741,7 @@
       </p:sp>
       <p:sp>
         <p:nvSpPr>
-          <p:cNvPr id="136" name="PlaceHolder 2"/>
+          <p:cNvPr id="137" name="PlaceHolder 2"/>
           <p:cNvSpPr>
             <a:spLocks noGrp="1"/>
           </p:cNvSpPr>
@@ -8391,7 +8816,7 @@
       </p:grpSpPr>
       <p:sp>
         <p:nvSpPr>
-          <p:cNvPr id="137" name="PlaceHolder 1"/>
+          <p:cNvPr id="138" name="PlaceHolder 1"/>
           <p:cNvSpPr>
             <a:spLocks noGrp="1"/>
           </p:cNvSpPr>
@@ -8433,7 +8858,7 @@
       </p:sp>
       <p:sp>
         <p:nvSpPr>
-          <p:cNvPr id="138" name="PlaceHolder 2"/>
+          <p:cNvPr id="139" name="PlaceHolder 2"/>
           <p:cNvSpPr>
             <a:spLocks noGrp="1"/>
           </p:cNvSpPr>
@@ -8508,7 +8933,7 @@
       </p:grpSpPr>
       <p:sp>
         <p:nvSpPr>
-          <p:cNvPr id="139" name="PlaceHolder 1"/>
+          <p:cNvPr id="140" name="PlaceHolder 1"/>
           <p:cNvSpPr>
             <a:spLocks noGrp="1"/>
           </p:cNvSpPr>
@@ -8550,7 +8975,7 @@
       </p:sp>
       <p:sp>
         <p:nvSpPr>
-          <p:cNvPr id="140" name="PlaceHolder 2"/>
+          <p:cNvPr id="141" name="PlaceHolder 2"/>
           <p:cNvSpPr>
             <a:spLocks noGrp="1"/>
           </p:cNvSpPr>
@@ -8625,7 +9050,7 @@
       </p:grpSpPr>
       <p:sp>
         <p:nvSpPr>
-          <p:cNvPr id="141" name="PlaceHolder 1"/>
+          <p:cNvPr id="142" name="PlaceHolder 1"/>
           <p:cNvSpPr>
             <a:spLocks noGrp="1"/>
           </p:cNvSpPr>
@@ -8667,7 +9092,7 @@
       </p:sp>
       <p:sp>
         <p:nvSpPr>
-          <p:cNvPr id="142" name="PlaceHolder 2"/>
+          <p:cNvPr id="143" name="PlaceHolder 2"/>
           <p:cNvSpPr>
             <a:spLocks noGrp="1"/>
           </p:cNvSpPr>
@@ -8742,7 +9167,7 @@
       </p:grpSpPr>
       <p:sp>
         <p:nvSpPr>
-          <p:cNvPr id="143" name="PlaceHolder 1"/>
+          <p:cNvPr id="144" name="PlaceHolder 1"/>
           <p:cNvSpPr>
             <a:spLocks noGrp="1"/>
           </p:cNvSpPr>
@@ -8784,7 +9209,7 @@
       </p:sp>
       <p:sp>
         <p:nvSpPr>
-          <p:cNvPr id="144" name="PlaceHolder 2"/>
+          <p:cNvPr id="145" name="PlaceHolder 2"/>
           <p:cNvSpPr>
             <a:spLocks noGrp="1"/>
           </p:cNvSpPr>
@@ -8859,7 +9284,7 @@
       </p:grpSpPr>
       <p:sp>
         <p:nvSpPr>
-          <p:cNvPr id="145" name="PlaceHolder 1"/>
+          <p:cNvPr id="146" name="PlaceHolder 1"/>
           <p:cNvSpPr>
             <a:spLocks noGrp="1"/>
           </p:cNvSpPr>
@@ -8901,7 +9326,7 @@
       </p:sp>
       <p:sp>
         <p:nvSpPr>
-          <p:cNvPr id="146" name="PlaceHolder 2"/>
+          <p:cNvPr id="147" name="PlaceHolder 2"/>
           <p:cNvSpPr>
             <a:spLocks noGrp="1"/>
           </p:cNvSpPr>
@@ -9041,7 +9466,7 @@
         </p:spPr>
         <p:txBody>
           <a:bodyPr lIns="0" rIns="0" tIns="0" bIns="0" anchor="t">
-            <a:normAutofit/>
+            <a:normAutofit lnSpcReduction="9999"/>
           </a:bodyPr>
           <a:p>
             <a:pPr marL="432000" indent="-324000">
@@ -9064,8 +9489,84 @@
                 <a:uFillTx/>
                 <a:latin typeface="Arial"/>
               </a:rPr>
-              <a:t>Network details for both bracnhes</a:t>
+              <a:t>Network details for both branches</a:t>
             </a:r>
+            <a:endParaRPr b="0" lang="en-AU" sz="3200" strike="noStrike" u="none">
+              <a:solidFill>
+                <a:srgbClr val="000000"/>
+              </a:solidFill>
+              <a:effectLst/>
+              <a:uFillTx/>
+              <a:latin typeface="Arial"/>
+            </a:endParaRPr>
+          </a:p>
+          <a:p>
+            <a:pPr indent="0">
+              <a:spcBef>
+                <a:spcPts val="1417"/>
+              </a:spcBef>
+              <a:buNone/>
+            </a:pPr>
+            <a:endParaRPr b="0" lang="en-AU" sz="3200" strike="noStrike" u="none">
+              <a:solidFill>
+                <a:srgbClr val="000000"/>
+              </a:solidFill>
+              <a:effectLst/>
+              <a:uFillTx/>
+              <a:latin typeface="Arial"/>
+            </a:endParaRPr>
+          </a:p>
+          <a:p>
+            <a:pPr indent="0">
+              <a:spcBef>
+                <a:spcPts val="1417"/>
+              </a:spcBef>
+              <a:buNone/>
+            </a:pPr>
+            <a:r>
+              <a:rPr b="0" lang="en-AU" sz="3200" strike="noStrike" u="none">
+                <a:solidFill>
+                  <a:srgbClr val="000000"/>
+                </a:solidFill>
+                <a:effectLst/>
+                <a:uFillTx/>
+                <a:latin typeface="Arial"/>
+              </a:rPr>
+              <a:t>Both are a dual-star, high-availability, that use Ethernet connections, only in Brisbane Branch uses Coax and phone Lines connections.</a:t>
+            </a:r>
+            <a:br>
+              <a:rPr sz="3200"/>
+            </a:br>
+            <a:br>
+              <a:rPr sz="3200"/>
+            </a:br>
+            <a:r>
+              <a:rPr b="0" lang="en-AU" sz="3200" strike="noStrike" u="none">
+                <a:solidFill>
+                  <a:srgbClr val="000000"/>
+                </a:solidFill>
+                <a:effectLst/>
+                <a:uFillTx/>
+                <a:latin typeface="Arial"/>
+              </a:rPr>
+              <a:t>Sydney is a 3-tier and Brisbane is a 2-tier network</a:t>
+            </a:r>
+            <a:endParaRPr b="0" lang="en-AU" sz="3200" strike="noStrike" u="none">
+              <a:solidFill>
+                <a:srgbClr val="000000"/>
+              </a:solidFill>
+              <a:effectLst/>
+              <a:uFillTx/>
+              <a:latin typeface="Arial"/>
+            </a:endParaRPr>
+          </a:p>
+          <a:p>
+            <a:pPr indent="0">
+              <a:spcBef>
+                <a:spcPts val="1417"/>
+              </a:spcBef>
+              <a:buNone/>
+            </a:pPr>
             <a:endParaRPr b="0" lang="en-AU" sz="3200" strike="noStrike" u="none">
               <a:solidFill>
                 <a:srgbClr val="000000"/>
@@ -9109,7 +9610,7 @@
       </p:grpSpPr>
       <p:sp>
         <p:nvSpPr>
-          <p:cNvPr id="147" name="PlaceHolder 1"/>
+          <p:cNvPr id="148" name="PlaceHolder 1"/>
           <p:cNvSpPr>
             <a:spLocks noGrp="1"/>
           </p:cNvSpPr>
@@ -9151,7 +9652,7 @@
       </p:sp>
       <p:sp>
         <p:nvSpPr>
-          <p:cNvPr id="148" name="PlaceHolder 2"/>
+          <p:cNvPr id="149" name="PlaceHolder 2"/>
           <p:cNvSpPr>
             <a:spLocks noGrp="1"/>
           </p:cNvSpPr>
@@ -9226,7 +9727,7 @@
       </p:grpSpPr>
       <p:sp>
         <p:nvSpPr>
-          <p:cNvPr id="149" name="PlaceHolder 1"/>
+          <p:cNvPr id="150" name="PlaceHolder 1"/>
           <p:cNvSpPr>
             <a:spLocks noGrp="1"/>
           </p:cNvSpPr>
@@ -9268,7 +9769,7 @@
       </p:sp>
       <p:sp>
         <p:nvSpPr>
-          <p:cNvPr id="150" name="PlaceHolder 2"/>
+          <p:cNvPr id="151" name="PlaceHolder 2"/>
           <p:cNvSpPr>
             <a:spLocks noGrp="1"/>
           </p:cNvSpPr>
@@ -9343,7 +9844,7 @@
       </p:grpSpPr>
       <p:sp>
         <p:nvSpPr>
-          <p:cNvPr id="151" name="PlaceHolder 1"/>
+          <p:cNvPr id="152" name="PlaceHolder 1"/>
           <p:cNvSpPr>
             <a:spLocks noGrp="1"/>
           </p:cNvSpPr>
@@ -9385,7 +9886,7 @@
       </p:sp>
       <p:sp>
         <p:nvSpPr>
-          <p:cNvPr id="152" name="PlaceHolder 2"/>
+          <p:cNvPr id="153" name="PlaceHolder 2"/>
           <p:cNvSpPr>
             <a:spLocks noGrp="1"/>
           </p:cNvSpPr>
@@ -9460,7 +9961,7 @@
       </p:grpSpPr>
       <p:sp>
         <p:nvSpPr>
-          <p:cNvPr id="153" name="PlaceHolder 1"/>
+          <p:cNvPr id="154" name="PlaceHolder 1"/>
           <p:cNvSpPr>
             <a:spLocks noGrp="1"/>
           </p:cNvSpPr>
@@ -9502,7 +10003,7 @@
       </p:sp>
       <p:sp>
         <p:nvSpPr>
-          <p:cNvPr id="154" name="PlaceHolder 2"/>
+          <p:cNvPr id="155" name="PlaceHolder 2"/>
           <p:cNvSpPr>
             <a:spLocks noGrp="1"/>
           </p:cNvSpPr>
@@ -9577,7 +10078,7 @@
       </p:grpSpPr>
       <p:sp>
         <p:nvSpPr>
-          <p:cNvPr id="155" name="PlaceHolder 1"/>
+          <p:cNvPr id="156" name="PlaceHolder 1"/>
           <p:cNvSpPr>
             <a:spLocks noGrp="1"/>
           </p:cNvSpPr>
@@ -9619,7 +10120,7 @@
       </p:sp>
       <p:sp>
         <p:nvSpPr>
-          <p:cNvPr id="156" name="PlaceHolder 2"/>
+          <p:cNvPr id="157" name="PlaceHolder 2"/>
           <p:cNvSpPr>
             <a:spLocks noGrp="1"/>
           </p:cNvSpPr>
@@ -9694,7 +10195,7 @@
       </p:grpSpPr>
       <p:sp>
         <p:nvSpPr>
-          <p:cNvPr id="157" name="PlaceHolder 1"/>
+          <p:cNvPr id="158" name="PlaceHolder 1"/>
           <p:cNvSpPr>
             <a:spLocks noGrp="1"/>
           </p:cNvSpPr>
@@ -9736,7 +10237,7 @@
       </p:sp>
       <p:sp>
         <p:nvSpPr>
-          <p:cNvPr id="158" name="PlaceHolder 2"/>
+          <p:cNvPr id="159" name="PlaceHolder 2"/>
           <p:cNvSpPr>
             <a:spLocks noGrp="1"/>
           </p:cNvSpPr>
@@ -9811,7 +10312,7 @@
       </p:grpSpPr>
       <p:sp>
         <p:nvSpPr>
-          <p:cNvPr id="159" name="PlaceHolder 1"/>
+          <p:cNvPr id="160" name="PlaceHolder 1"/>
           <p:cNvSpPr>
             <a:spLocks noGrp="1"/>
           </p:cNvSpPr>
@@ -9853,7 +10354,124 @@
       </p:sp>
       <p:sp>
         <p:nvSpPr>
-          <p:cNvPr id="160" name="PlaceHolder 2"/>
+          <p:cNvPr id="161" name="PlaceHolder 2"/>
+          <p:cNvSpPr>
+            <a:spLocks noGrp="1"/>
+          </p:cNvSpPr>
+          <p:nvPr>
+            <p:ph/>
+          </p:nvPr>
+        </p:nvSpPr>
+        <p:spPr>
+          <a:xfrm>
+            <a:off x="504000" y="1326600"/>
+            <a:ext cx="9071640" cy="3288240"/>
+          </a:xfrm>
+          <a:prstGeom prst="rect">
+            <a:avLst/>
+          </a:prstGeom>
+          <a:noFill/>
+          <a:ln w="0">
+            <a:noFill/>
+          </a:ln>
+        </p:spPr>
+        <p:txBody>
+          <a:bodyPr lIns="0" rIns="0" tIns="0" bIns="0" anchor="t">
+            <a:normAutofit/>
+          </a:bodyPr>
+          <a:p>
+            <a:pPr indent="0">
+              <a:spcBef>
+                <a:spcPts val="1417"/>
+              </a:spcBef>
+              <a:buNone/>
+            </a:pPr>
+            <a:endParaRPr b="0" lang="en-AU" sz="3200" strike="noStrike" u="none">
+              <a:solidFill>
+                <a:srgbClr val="000000"/>
+              </a:solidFill>
+              <a:effectLst/>
+              <a:uFillTx/>
+              <a:latin typeface="Arial"/>
+            </a:endParaRPr>
+          </a:p>
+        </p:txBody>
+      </p:sp>
+    </p:spTree>
+  </p:cSld>
+  <mc:AlternateContent>
+    <mc:Choice Requires="p14">
+      <p:transition spd="slow" p14:dur="2000"/>
+    </mc:Choice>
+    <mc:Fallback>
+      <p:transition spd="slow"/>
+    </mc:Fallback>
+  </mc:AlternateContent>
+</p:sld>
+</file>
+
+<file path=ppt/slides/slide77.xml><?xml version="1.0" encoding="utf-8"?>
+<p:sld xmlns:a="http://schemas.openxmlformats.org/drawingml/2006/main" xmlns:p="http://schemas.openxmlformats.org/presentationml/2006/main" xmlns:r="http://schemas.openxmlformats.org/officeDocument/2006/relationships" xmlns:p14="http://schemas.microsoft.com/office/powerpoint/2010/main" xmlns:p15="http://schemas.microsoft.com/office/powerpoint/2012/main" xmlns:mc="http://schemas.openxmlformats.org/markup-compatibility/2006">
+  <p:cSld>
+    <p:spTree>
+      <p:nvGrpSpPr>
+        <p:cNvPr id="1" name=""/>
+        <p:cNvGrpSpPr/>
+        <p:nvPr/>
+      </p:nvGrpSpPr>
+      <p:grpSpPr>
+        <a:xfrm>
+          <a:off x="0" y="0"/>
+          <a:ext cx="0" cy="0"/>
+          <a:chOff x="0" y="0"/>
+          <a:chExt cx="0" cy="0"/>
+        </a:xfrm>
+      </p:grpSpPr>
+      <p:sp>
+        <p:nvSpPr>
+          <p:cNvPr id="162" name="PlaceHolder 1"/>
+          <p:cNvSpPr>
+            <a:spLocks noGrp="1"/>
+          </p:cNvSpPr>
+          <p:nvPr>
+            <p:ph type="title"/>
+          </p:nvPr>
+        </p:nvSpPr>
+        <p:spPr>
+          <a:xfrm>
+            <a:off x="504000" y="226080"/>
+            <a:ext cx="9071640" cy="946440"/>
+          </a:xfrm>
+          <a:prstGeom prst="rect">
+            <a:avLst/>
+          </a:prstGeom>
+          <a:noFill/>
+          <a:ln w="0">
+            <a:noFill/>
+          </a:ln>
+        </p:spPr>
+        <p:txBody>
+          <a:bodyPr lIns="0" rIns="0" tIns="0" bIns="0" anchor="ctr">
+            <a:spAutoFit/>
+          </a:bodyPr>
+          <a:p>
+            <a:pPr indent="0" algn="ctr">
+              <a:buNone/>
+            </a:pPr>
+            <a:endParaRPr b="0" lang="en-AU" sz="4400" strike="noStrike" u="none">
+              <a:solidFill>
+                <a:srgbClr val="000000"/>
+              </a:solidFill>
+              <a:effectLst/>
+              <a:uFillTx/>
+              <a:latin typeface="Arial"/>
+            </a:endParaRPr>
+          </a:p>
+        </p:txBody>
+      </p:sp>
+      <p:sp>
+        <p:nvSpPr>
+          <p:cNvPr id="163" name="PlaceHolder 2"/>
           <p:cNvSpPr>
             <a:spLocks noGrp="1"/>
           </p:cNvSpPr>
@@ -10129,6 +10747,65 @@
                 <a:latin typeface="Arial"/>
               </a:rPr>
               <a:t>I gonna cover these topics</a:t>
+            </a:r>
+            <a:endParaRPr b="0" lang="en-AU" sz="3200" strike="noStrike" u="none">
+              <a:solidFill>
+                <a:srgbClr val="000000"/>
+              </a:solidFill>
+              <a:effectLst/>
+              <a:uFillTx/>
+              <a:latin typeface="Arial"/>
+            </a:endParaRPr>
+          </a:p>
+          <a:p>
+            <a:pPr indent="0">
+              <a:spcBef>
+                <a:spcPts val="1417"/>
+              </a:spcBef>
+              <a:buNone/>
+            </a:pPr>
+            <a:endParaRPr b="0" lang="en-AU" sz="3200" strike="noStrike" u="none">
+              <a:solidFill>
+                <a:srgbClr val="000000"/>
+              </a:solidFill>
+              <a:effectLst/>
+              <a:uFillTx/>
+              <a:latin typeface="Arial"/>
+            </a:endParaRPr>
+          </a:p>
+          <a:p>
+            <a:pPr indent="0">
+              <a:spcBef>
+                <a:spcPts val="1417"/>
+              </a:spcBef>
+              <a:buNone/>
+            </a:pPr>
+            <a:endParaRPr b="0" lang="en-AU" sz="3200" strike="noStrike" u="none">
+              <a:solidFill>
+                <a:srgbClr val="000000"/>
+              </a:solidFill>
+              <a:effectLst/>
+              <a:uFillTx/>
+              <a:latin typeface="Arial"/>
+            </a:endParaRPr>
+          </a:p>
+          <a:p>
+            <a:pPr indent="0">
+              <a:spcBef>
+                <a:spcPts val="1417"/>
+              </a:spcBef>
+              <a:buNone/>
+            </a:pPr>
+            <a:r>
+              <a:rPr b="0" lang="en-AU" sz="3200" strike="noStrike" u="none">
+                <a:solidFill>
+                  <a:srgbClr val="000000"/>
+                </a:solidFill>
+                <a:effectLst/>
+                <a:uFillTx/>
+                <a:latin typeface="Arial"/>
+              </a:rPr>
+              <a:t>I have included “WAN Configuration and Troubleshooting &amp; Testing” together to show their results</a:t>
             </a:r>
             <a:endParaRPr b="0" lang="en-AU" sz="3200" strike="noStrike" u="none">
               <a:solidFill>

</xml_diff>

<commit_message>
presentation and guide done
</commit_message>
<xml_diff>
--- a/TERM1-BLOCK1/2-ICTNWK541-Configure_Verify_Troubleshoot_WAN_links-IP_services/Assessmet_Task2/Task2/PacketTracer/guide-presentation.pptx
+++ b/TERM1-BLOCK1/2-ICTNWK541-Configure_Verify_Troubleshoot_WAN_links-IP_services/Assessmet_Task2/Task2/PacketTracer/guide-presentation.pptx
@@ -226,7 +226,7 @@
         <p:txBody>
           <a:bodyPr/>
           <a:p>
-            <a:fld id="{28BAEA5D-9F7D-4075-AFD1-0A8C1CBAE16D}" type="slidenum">
+            <a:fld id="{95DBBD25-7879-4C2F-AAFD-3F8C6418DDCE}" type="slidenum">
               <a:t>&lt;#&gt;</a:t>
             </a:fld>
           </a:p>
@@ -393,7 +393,7 @@
         <p:txBody>
           <a:bodyPr/>
           <a:p>
-            <a:fld id="{27C2FF7F-06E2-447D-8A54-8ECC2C942F19}" type="slidenum">
+            <a:fld id="{60D7B84E-44B7-4040-AC5C-2BBB162AB865}" type="slidenum">
               <a:t>&lt;#&gt;</a:t>
             </a:fld>
           </a:p>
@@ -924,7 +924,7 @@
             <a:pPr indent="0" algn="r">
               <a:buNone/>
             </a:pPr>
-            <a:fld id="{B7DD3F04-990D-42C7-9728-4FAC6CC77BCD}" type="slidenum">
+            <a:fld id="{2E322109-BD62-4DFF-86C1-FC9B3FC9F78D}" type="slidenum">
               <a:rPr b="0" lang="en-AU" sz="1400" strike="noStrike" u="none">
                 <a:solidFill>
                   <a:srgbClr val="000000"/>
@@ -7698,12 +7698,82 @@
             <a:normAutofit/>
           </a:bodyPr>
           <a:p>
-            <a:pPr indent="0">
+            <a:pPr marL="432000" indent="0">
               <a:spcBef>
                 <a:spcPts val="1417"/>
               </a:spcBef>
               <a:buNone/>
             </a:pPr>
+            <a:r>
+              <a:rPr b="0" lang="en-AU" sz="3200" strike="noStrike" u="none">
+                <a:solidFill>
+                  <a:srgbClr val="000000"/>
+                </a:solidFill>
+                <a:effectLst/>
+                <a:uFillTx/>
+                <a:latin typeface="Arial"/>
+              </a:rPr>
+              <a:t>My network doesn't support PPP because the WAN connections are Ethernet. PPP requires serial connections. Additionally, PPP isn't compatible with HSRP. </a:t>
+            </a:r>
+            <a:endParaRPr b="0" lang="en-AU" sz="3200" strike="noStrike" u="none">
+              <a:solidFill>
+                <a:srgbClr val="000000"/>
+              </a:solidFill>
+              <a:effectLst/>
+              <a:uFillTx/>
+              <a:latin typeface="Arial"/>
+            </a:endParaRPr>
+          </a:p>
+          <a:p>
+            <a:pPr marL="432000" indent="0">
+              <a:spcBef>
+                <a:spcPts val="1417"/>
+              </a:spcBef>
+              <a:buNone/>
+            </a:pPr>
+            <a:r>
+              <a:rPr b="0" lang="en-AU" sz="3200" strike="noStrike" u="none">
+                <a:solidFill>
+                  <a:srgbClr val="000000"/>
+                </a:solidFill>
+                <a:effectLst/>
+                <a:uFillTx/>
+                <a:latin typeface="Arial"/>
+              </a:rPr>
+              <a:t> </a:t>
+            </a:r>
+            <a:endParaRPr b="0" lang="en-AU" sz="3200" strike="noStrike" u="none">
+              <a:solidFill>
+                <a:srgbClr val="000000"/>
+              </a:solidFill>
+              <a:effectLst/>
+              <a:uFillTx/>
+              <a:latin typeface="Arial"/>
+            </a:endParaRPr>
+          </a:p>
+          <a:p>
+            <a:pPr marL="432000" indent="-324000">
+              <a:spcBef>
+                <a:spcPts val="1417"/>
+              </a:spcBef>
+              <a:buClr>
+                <a:srgbClr val="000000"/>
+              </a:buClr>
+              <a:buSzPct val="45000"/>
+              <a:buFont typeface="Wingdings" charset="2"/>
+              <a:buChar char=""/>
+            </a:pPr>
+            <a:r>
+              <a:rPr b="0" lang="en-AU" sz="3200" strike="noStrike" u="none">
+                <a:solidFill>
+                  <a:srgbClr val="000000"/>
+                </a:solidFill>
+                <a:effectLst/>
+                <a:uFillTx/>
+                <a:latin typeface="Arial"/>
+              </a:rPr>
+              <a:t>So I used the reference network given in class.</a:t>
+            </a:r>
             <a:endParaRPr b="0" lang="en-AU" sz="3200" strike="noStrike" u="none">
               <a:solidFill>
                 <a:srgbClr val="000000"/>
@@ -7815,12 +7885,50 @@
             <a:normAutofit/>
           </a:bodyPr>
           <a:p>
-            <a:pPr indent="0">
+            <a:pPr marL="432000" indent="0">
               <a:spcBef>
                 <a:spcPts val="1417"/>
               </a:spcBef>
               <a:buNone/>
             </a:pPr>
+            <a:r>
+              <a:rPr b="0" lang="en-AU" sz="3200" strike="noStrike" u="none">
+                <a:solidFill>
+                  <a:srgbClr val="000000"/>
+                </a:solidFill>
+                <a:effectLst/>
+                <a:uFillTx/>
+                <a:latin typeface="Arial"/>
+              </a:rPr>
+              <a:t>I have Implemented CHAP as an automatic authentication method.</a:t>
+            </a:r>
+            <a:endParaRPr b="0" lang="en-AU" sz="3200" strike="noStrike" u="none">
+              <a:solidFill>
+                <a:srgbClr val="000000"/>
+              </a:solidFill>
+              <a:effectLst/>
+              <a:uFillTx/>
+              <a:latin typeface="Arial"/>
+            </a:endParaRPr>
+          </a:p>
+          <a:p>
+            <a:pPr marL="432000" indent="0">
+              <a:spcBef>
+                <a:spcPts val="1417"/>
+              </a:spcBef>
+              <a:buNone/>
+            </a:pPr>
+            <a:r>
+              <a:rPr b="0" lang="en-AU" sz="3200" strike="noStrike" u="none">
+                <a:solidFill>
+                  <a:srgbClr val="000000"/>
+                </a:solidFill>
+                <a:effectLst/>
+                <a:uFillTx/>
+                <a:latin typeface="Arial"/>
+              </a:rPr>
+              <a:t> </a:t>
+            </a:r>
             <a:endParaRPr b="0" lang="en-AU" sz="3200" strike="noStrike" u="none">
               <a:solidFill>
                 <a:srgbClr val="000000"/>
@@ -8049,12 +8157,23 @@
             <a:normAutofit/>
           </a:bodyPr>
           <a:p>
-            <a:pPr indent="0">
+            <a:pPr marL="432000" indent="0">
               <a:spcBef>
                 <a:spcPts val="1417"/>
               </a:spcBef>
               <a:buNone/>
             </a:pPr>
+            <a:r>
+              <a:rPr b="0" lang="en-AU" sz="3200" strike="noStrike" u="none">
+                <a:solidFill>
+                  <a:srgbClr val="000000"/>
+                </a:solidFill>
+                <a:effectLst/>
+                <a:uFillTx/>
+                <a:latin typeface="Arial"/>
+              </a:rPr>
+              <a:t>Dynamic NAT were performed on the file shared in class due to extra complexity over my network.</a:t>
+            </a:r>
             <a:endParaRPr b="0" lang="en-AU" sz="3200" strike="noStrike" u="none">
               <a:solidFill>
                 <a:srgbClr val="000000"/>
@@ -8650,12 +8769,50 @@
             <a:normAutofit/>
           </a:bodyPr>
           <a:p>
-            <a:pPr indent="0">
+            <a:pPr marL="432000" indent="0">
               <a:spcBef>
                 <a:spcPts val="1417"/>
               </a:spcBef>
               <a:buNone/>
             </a:pPr>
+            <a:r>
+              <a:rPr b="0" lang="en-AU" sz="3200" strike="noStrike" u="none">
+                <a:solidFill>
+                  <a:srgbClr val="000000"/>
+                </a:solidFill>
+                <a:effectLst/>
+                <a:uFillTx/>
+                <a:latin typeface="Arial"/>
+              </a:rPr>
+              <a:t>Also, Firewall and single-port tests were performed on the file submitted in class due to extra complexity over my network.</a:t>
+            </a:r>
+            <a:endParaRPr b="0" lang="en-AU" sz="3200" strike="noStrike" u="none">
+              <a:solidFill>
+                <a:srgbClr val="000000"/>
+              </a:solidFill>
+              <a:effectLst/>
+              <a:uFillTx/>
+              <a:latin typeface="Arial"/>
+            </a:endParaRPr>
+          </a:p>
+          <a:p>
+            <a:pPr marL="432000" indent="0">
+              <a:spcBef>
+                <a:spcPts val="1417"/>
+              </a:spcBef>
+              <a:buNone/>
+            </a:pPr>
+            <a:r>
+              <a:rPr b="0" lang="en-AU" sz="3200" strike="noStrike" u="none">
+                <a:solidFill>
+                  <a:srgbClr val="000000"/>
+                </a:solidFill>
+                <a:effectLst/>
+                <a:uFillTx/>
+                <a:latin typeface="Arial"/>
+              </a:rPr>
+              <a:t> </a:t>
+            </a:r>
             <a:endParaRPr b="0" lang="en-AU" sz="3200" strike="noStrike" u="none">
               <a:solidFill>
                 <a:srgbClr val="000000"/>
@@ -9352,12 +9509,23 @@
             <a:normAutofit/>
           </a:bodyPr>
           <a:p>
-            <a:pPr indent="0">
+            <a:pPr marL="432000" indent="0">
               <a:spcBef>
                 <a:spcPts val="1417"/>
               </a:spcBef>
               <a:buNone/>
             </a:pPr>
+            <a:r>
+              <a:rPr b="0" lang="en-AU" sz="3200" strike="noStrike" u="none">
+                <a:solidFill>
+                  <a:srgbClr val="000000"/>
+                </a:solidFill>
+                <a:effectLst/>
+                <a:uFillTx/>
+                <a:latin typeface="Arial"/>
+              </a:rPr>
+              <a:t>I have created a sheet with a brief explanation of the technologies I have used.</a:t>
+            </a:r>
             <a:endParaRPr b="0" lang="en-AU" sz="3200" strike="noStrike" u="none">
               <a:solidFill>
                 <a:srgbClr val="000000"/>
@@ -10263,12 +10431,23 @@
             <a:normAutofit/>
           </a:bodyPr>
           <a:p>
-            <a:pPr indent="0">
+            <a:pPr marL="432000" indent="0">
               <a:spcBef>
                 <a:spcPts val="1417"/>
               </a:spcBef>
               <a:buNone/>
             </a:pPr>
+            <a:r>
+              <a:rPr b="0" lang="en-AU" sz="3200" strike="noStrike" u="none">
+                <a:solidFill>
+                  <a:srgbClr val="000000"/>
+                </a:solidFill>
+                <a:effectLst/>
+                <a:uFillTx/>
+                <a:latin typeface="Arial"/>
+              </a:rPr>
+              <a:t>Mainly the information I have used has been from these web sources</a:t>
+            </a:r>
             <a:endParaRPr b="0" lang="en-AU" sz="3200" strike="noStrike" u="none">
               <a:solidFill>
                 <a:srgbClr val="000000"/>

</xml_diff>